<commit_message>
Add L2 - Boolean algebra and Combinational circuits
</commit_message>
<xml_diff>
--- a/digital_design/Lecture_1__1_Sep__Intro.pptx
+++ b/digital_design/Lecture_1__1_Sep__Intro.pptx
@@ -145,7 +145,7 @@
 <file path=ppt/revisionInfo.xml><?xml version="1.0" encoding="utf-8"?>
 <p1510:revInfo xmlns:a="http://schemas.openxmlformats.org/drawingml/2006/main" xmlns:r="http://schemas.openxmlformats.org/officeDocument/2006/relationships" xmlns:p1510="http://schemas.microsoft.com/office/powerpoint/2015/10/main">
   <p1510:revLst>
-    <p1510:client id="{307D2746-F16A-4F44-94CB-B013E0FF6FFA}" v="134" dt="2021-08-31T22:52:32.892"/>
+    <p1510:client id="{307D2746-F16A-4F44-94CB-B013E0FF6FFA}" v="136" dt="2021-09-01T07:20:53.686"/>
   </p1510:revLst>
 </p1510:revInfo>
 </file>
@@ -155,7 +155,7 @@
   <pc:docChgLst>
     <pc:chgData name="Smirnov, Igor" userId="7512555a-d6bf-4868-b78f-1932e0818ba1" providerId="ADAL" clId="{307D2746-F16A-4F44-94CB-B013E0FF6FFA}"/>
     <pc:docChg chg="undo custSel modSld">
-      <pc:chgData name="Smirnov, Igor" userId="7512555a-d6bf-4868-b78f-1932e0818ba1" providerId="ADAL" clId="{307D2746-F16A-4F44-94CB-B013E0FF6FFA}" dt="2021-08-31T22:52:53.406" v="190" actId="20577"/>
+      <pc:chgData name="Smirnov, Igor" userId="7512555a-d6bf-4868-b78f-1932e0818ba1" providerId="ADAL" clId="{307D2746-F16A-4F44-94CB-B013E0FF6FFA}" dt="2021-09-01T07:20:53.686" v="192" actId="20577"/>
       <pc:docMkLst>
         <pc:docMk/>
       </pc:docMkLst>
@@ -171,6 +171,21 @@
             <pc:docMk/>
             <pc:sldMk cId="1079667233" sldId="258"/>
             <ac:spMk id="55" creationId="{00000000-0000-0000-0000-000000000000}"/>
+          </ac:spMkLst>
+        </pc:spChg>
+      </pc:sldChg>
+      <pc:sldChg chg="modSp">
+        <pc:chgData name="Smirnov, Igor" userId="7512555a-d6bf-4868-b78f-1932e0818ba1" providerId="ADAL" clId="{307D2746-F16A-4F44-94CB-B013E0FF6FFA}" dt="2021-09-01T07:20:53.686" v="192" actId="20577"/>
+        <pc:sldMkLst>
+          <pc:docMk/>
+          <pc:sldMk cId="2059569512" sldId="260"/>
+        </pc:sldMkLst>
+        <pc:spChg chg="mod">
+          <ac:chgData name="Smirnov, Igor" userId="7512555a-d6bf-4868-b78f-1932e0818ba1" providerId="ADAL" clId="{307D2746-F16A-4F44-94CB-B013E0FF6FFA}" dt="2021-09-01T07:20:53.686" v="192" actId="20577"/>
+          <ac:spMkLst>
+            <pc:docMk/>
+            <pc:sldMk cId="2059569512" sldId="260"/>
+            <ac:spMk id="11" creationId="{00000000-0000-0000-0000-000000000000}"/>
           </ac:spMkLst>
         </pc:spChg>
       </pc:sldChg>
@@ -17583,7 +17598,7 @@
                   <a:schemeClr val="accent4"/>
                 </a:solidFill>
               </a:rPr>
-              <a:t>CS Triangle</a:t>
+              <a:t>CE Triangle</a:t>
             </a:r>
           </a:p>
         </p:txBody>

</xml_diff>

<commit_message>
L1 - Fixed contact info
</commit_message>
<xml_diff>
--- a/digital_design/Lecture_1__1_Sep__Intro.pptx
+++ b/digital_design/Lecture_1__1_Sep__Intro.pptx
@@ -145,7 +145,7 @@
 <file path=ppt/revisionInfo.xml><?xml version="1.0" encoding="utf-8"?>
 <p1510:revInfo xmlns:a="http://schemas.openxmlformats.org/drawingml/2006/main" xmlns:r="http://schemas.openxmlformats.org/officeDocument/2006/relationships" xmlns:p1510="http://schemas.microsoft.com/office/powerpoint/2015/10/main">
   <p1510:revLst>
-    <p1510:client id="{307D2746-F16A-4F44-94CB-B013E0FF6FFA}" v="136" dt="2021-09-01T07:20:53.686"/>
+    <p1510:client id="{307D2746-F16A-4F44-94CB-B013E0FF6FFA}" v="138" dt="2021-09-08T12:00:40.064"/>
   </p1510:revLst>
 </p1510:revInfo>
 </file>
@@ -306,7 +306,7 @@
           <a:p>
             <a:fld id="{8D8C6AA0-880B-4B1C-A1E5-DBC0B3A6C8B7}" type="datetimeFigureOut">
               <a:rPr lang="ru-RU" smtClean="0"/>
-              <a:t>01.09.2021</a:t>
+              <a:t>08.09.2021</a:t>
             </a:fld>
             <a:endParaRPr lang="ru-RU"/>
           </a:p>
@@ -11093,7 +11093,7 @@
               <a:rPr lang="en-US" dirty="0">
                 <a:hlinkClick r:id="rId3"/>
               </a:rPr>
-              <a:t>igor.smirnov@intel.com</a:t>
+              <a:t>igor.smirnov@phystech.edu</a:t>
             </a:r>
             <a:endParaRPr lang="en-US" dirty="0"/>
           </a:p>

</xml_diff>